<commit_message>
Überarbeitung und hinzufügen von Folien
</commit_message>
<xml_diff>
--- a/Präsi/FlyHigh Abschlusspräsentation.pptx
+++ b/Präsi/FlyHigh Abschlusspräsentation.pptx
@@ -15,10 +15,11 @@
     <p:sldId id="263" r:id="rId9"/>
     <p:sldId id="264" r:id="rId10"/>
     <p:sldId id="265" r:id="rId11"/>
-    <p:sldId id="266" r:id="rId12"/>
-    <p:sldId id="267" r:id="rId13"/>
-    <p:sldId id="269" r:id="rId14"/>
-    <p:sldId id="268" r:id="rId15"/>
+    <p:sldId id="270" r:id="rId12"/>
+    <p:sldId id="266" r:id="rId13"/>
+    <p:sldId id="267" r:id="rId14"/>
+    <p:sldId id="269" r:id="rId15"/>
+    <p:sldId id="268" r:id="rId16"/>
   </p:sldIdLst>
   <p:sldSz cx="12192000" cy="6858000"/>
   <p:notesSz cx="6858000" cy="9144000"/>
@@ -309,7 +310,7 @@
           <a:p>
             <a:fld id="{82333757-7549-43D3-A03E-9E27EAF922C5}" type="datetimeFigureOut">
               <a:rPr lang="de-DE" smtClean="0"/>
-              <a:t>01.10.2015</a:t>
+              <a:t>02.10.2015</a:t>
             </a:fld>
             <a:endParaRPr lang="de-DE"/>
           </a:p>
@@ -745,7 +746,7 @@
           <a:p>
             <a:fld id="{82333757-7549-43D3-A03E-9E27EAF922C5}" type="datetimeFigureOut">
               <a:rPr lang="de-DE" smtClean="0"/>
-              <a:t>01.10.2015</a:t>
+              <a:t>02.10.2015</a:t>
             </a:fld>
             <a:endParaRPr lang="de-DE"/>
           </a:p>
@@ -993,7 +994,7 @@
           <a:p>
             <a:fld id="{82333757-7549-43D3-A03E-9E27EAF922C5}" type="datetimeFigureOut">
               <a:rPr lang="de-DE" smtClean="0"/>
-              <a:t>01.10.2015</a:t>
+              <a:t>02.10.2015</a:t>
             </a:fld>
             <a:endParaRPr lang="de-DE"/>
           </a:p>
@@ -1299,7 +1300,7 @@
           <a:p>
             <a:fld id="{82333757-7549-43D3-A03E-9E27EAF922C5}" type="datetimeFigureOut">
               <a:rPr lang="de-DE" smtClean="0"/>
-              <a:t>01.10.2015</a:t>
+              <a:t>02.10.2015</a:t>
             </a:fld>
             <a:endParaRPr lang="de-DE"/>
           </a:p>
@@ -1615,7 +1616,7 @@
           <a:p>
             <a:fld id="{82333757-7549-43D3-A03E-9E27EAF922C5}" type="datetimeFigureOut">
               <a:rPr lang="de-DE" smtClean="0"/>
-              <a:t>01.10.2015</a:t>
+              <a:t>02.10.2015</a:t>
             </a:fld>
             <a:endParaRPr lang="de-DE"/>
           </a:p>
@@ -1915,7 +1916,7 @@
           <a:p>
             <a:fld id="{82333757-7549-43D3-A03E-9E27EAF922C5}" type="datetimeFigureOut">
               <a:rPr lang="de-DE" smtClean="0"/>
-              <a:t>01.10.2015</a:t>
+              <a:t>02.10.2015</a:t>
             </a:fld>
             <a:endParaRPr lang="de-DE"/>
           </a:p>
@@ -2280,7 +2281,7 @@
           <a:p>
             <a:fld id="{82333757-7549-43D3-A03E-9E27EAF922C5}" type="datetimeFigureOut">
               <a:rPr lang="de-DE" smtClean="0"/>
-              <a:t>01.10.2015</a:t>
+              <a:t>02.10.2015</a:t>
             </a:fld>
             <a:endParaRPr lang="de-DE"/>
           </a:p>
@@ -2454,7 +2455,7 @@
           <a:p>
             <a:fld id="{82333757-7549-43D3-A03E-9E27EAF922C5}" type="datetimeFigureOut">
               <a:rPr lang="de-DE" smtClean="0"/>
-              <a:t>01.10.2015</a:t>
+              <a:t>02.10.2015</a:t>
             </a:fld>
             <a:endParaRPr lang="de-DE"/>
           </a:p>
@@ -2634,7 +2635,7 @@
           <a:p>
             <a:fld id="{82333757-7549-43D3-A03E-9E27EAF922C5}" type="datetimeFigureOut">
               <a:rPr lang="de-DE" smtClean="0"/>
-              <a:t>01.10.2015</a:t>
+              <a:t>02.10.2015</a:t>
             </a:fld>
             <a:endParaRPr lang="de-DE"/>
           </a:p>
@@ -2804,7 +2805,7 @@
           <a:p>
             <a:fld id="{82333757-7549-43D3-A03E-9E27EAF922C5}" type="datetimeFigureOut">
               <a:rPr lang="de-DE" smtClean="0"/>
-              <a:t>01.10.2015</a:t>
+              <a:t>02.10.2015</a:t>
             </a:fld>
             <a:endParaRPr lang="de-DE"/>
           </a:p>
@@ -3052,7 +3053,7 @@
           <a:p>
             <a:fld id="{82333757-7549-43D3-A03E-9E27EAF922C5}" type="datetimeFigureOut">
               <a:rPr lang="de-DE" smtClean="0"/>
-              <a:t>01.10.2015</a:t>
+              <a:t>02.10.2015</a:t>
             </a:fld>
             <a:endParaRPr lang="de-DE"/>
           </a:p>
@@ -3288,7 +3289,7 @@
           <a:p>
             <a:fld id="{82333757-7549-43D3-A03E-9E27EAF922C5}" type="datetimeFigureOut">
               <a:rPr lang="de-DE" smtClean="0"/>
-              <a:t>01.10.2015</a:t>
+              <a:t>02.10.2015</a:t>
             </a:fld>
             <a:endParaRPr lang="de-DE"/>
           </a:p>
@@ -3670,7 +3671,7 @@
           <a:p>
             <a:fld id="{82333757-7549-43D3-A03E-9E27EAF922C5}" type="datetimeFigureOut">
               <a:rPr lang="de-DE" smtClean="0"/>
-              <a:t>01.10.2015</a:t>
+              <a:t>02.10.2015</a:t>
             </a:fld>
             <a:endParaRPr lang="de-DE"/>
           </a:p>
@@ -3788,7 +3789,7 @@
           <a:p>
             <a:fld id="{82333757-7549-43D3-A03E-9E27EAF922C5}" type="datetimeFigureOut">
               <a:rPr lang="de-DE" smtClean="0"/>
-              <a:t>01.10.2015</a:t>
+              <a:t>02.10.2015</a:t>
             </a:fld>
             <a:endParaRPr lang="de-DE"/>
           </a:p>
@@ -3883,7 +3884,7 @@
           <a:p>
             <a:fld id="{82333757-7549-43D3-A03E-9E27EAF922C5}" type="datetimeFigureOut">
               <a:rPr lang="de-DE" smtClean="0"/>
-              <a:t>01.10.2015</a:t>
+              <a:t>02.10.2015</a:t>
             </a:fld>
             <a:endParaRPr lang="de-DE"/>
           </a:p>
@@ -4138,7 +4139,7 @@
           <a:p>
             <a:fld id="{82333757-7549-43D3-A03E-9E27EAF922C5}" type="datetimeFigureOut">
               <a:rPr lang="de-DE" smtClean="0"/>
-              <a:t>01.10.2015</a:t>
+              <a:t>02.10.2015</a:t>
             </a:fld>
             <a:endParaRPr lang="de-DE"/>
           </a:p>
@@ -4421,7 +4422,7 @@
           <a:p>
             <a:fld id="{82333757-7549-43D3-A03E-9E27EAF922C5}" type="datetimeFigureOut">
               <a:rPr lang="de-DE" smtClean="0"/>
-              <a:t>01.10.2015</a:t>
+              <a:t>02.10.2015</a:t>
             </a:fld>
             <a:endParaRPr lang="de-DE"/>
           </a:p>
@@ -4827,7 +4828,7 @@
           <a:p>
             <a:fld id="{82333757-7549-43D3-A03E-9E27EAF922C5}" type="datetimeFigureOut">
               <a:rPr lang="de-DE" smtClean="0"/>
-              <a:t>01.10.2015</a:t>
+              <a:t>02.10.2015</a:t>
             </a:fld>
             <a:endParaRPr lang="de-DE"/>
           </a:p>
@@ -5522,7 +5523,6 @@
               <a:rPr lang="de-DE" sz="4000" dirty="0" smtClean="0"/>
               <a:t>Gewonnen nach Abschuss aller Zielscheiben ohne Zeitüberschreitung bzw. Kollision mit Objekten</a:t>
             </a:r>
-            <a:endParaRPr lang="de-DE" sz="4000" dirty="0" smtClean="0"/>
           </a:p>
         </p:txBody>
       </p:sp>
@@ -5547,6 +5547,169 @@
 </file>
 
 <file path=ppt/slides/slide11.xml><?xml version="1.0" encoding="utf-8"?>
+<p:sld xmlns:a="http://schemas.openxmlformats.org/drawingml/2006/main" xmlns:r="http://schemas.openxmlformats.org/officeDocument/2006/relationships" xmlns:p="http://schemas.openxmlformats.org/presentationml/2006/main">
+  <p:cSld>
+    <p:spTree>
+      <p:nvGrpSpPr>
+        <p:cNvPr id="1" name=""/>
+        <p:cNvGrpSpPr/>
+        <p:nvPr/>
+      </p:nvGrpSpPr>
+      <p:grpSpPr>
+        <a:xfrm>
+          <a:off x="0" y="0"/>
+          <a:ext cx="0" cy="0"/>
+          <a:chOff x="0" y="0"/>
+          <a:chExt cx="0" cy="0"/>
+        </a:xfrm>
+      </p:grpSpPr>
+      <p:sp>
+        <p:nvSpPr>
+          <p:cNvPr id="2" name="Titel 1"/>
+          <p:cNvSpPr>
+            <a:spLocks noGrp="1"/>
+          </p:cNvSpPr>
+          <p:nvPr>
+            <p:ph type="ctrTitle"/>
+          </p:nvPr>
+        </p:nvSpPr>
+        <p:spPr>
+          <a:xfrm>
+            <a:off x="1970904" y="261257"/>
+            <a:ext cx="8001000" cy="1238795"/>
+          </a:xfrm>
+        </p:spPr>
+        <p:txBody>
+          <a:bodyPr/>
+          <a:lstStyle/>
+          <a:p>
+            <a:pPr algn="ctr"/>
+            <a:r>
+              <a:rPr lang="de-DE" dirty="0" smtClean="0"/>
+              <a:t>Wofür gute </a:t>
+            </a:r>
+            <a:r>
+              <a:rPr lang="de-DE" dirty="0" err="1" smtClean="0"/>
+              <a:t>note</a:t>
+            </a:r>
+            <a:endParaRPr lang="de-DE" dirty="0"/>
+          </a:p>
+        </p:txBody>
+      </p:sp>
+      <p:sp>
+        <p:nvSpPr>
+          <p:cNvPr id="3" name="Untertitel 2"/>
+          <p:cNvSpPr>
+            <a:spLocks noGrp="1"/>
+          </p:cNvSpPr>
+          <p:nvPr>
+            <p:ph type="subTitle" idx="1"/>
+          </p:nvPr>
+        </p:nvSpPr>
+        <p:spPr>
+          <a:xfrm>
+            <a:off x="1110388" y="1679243"/>
+            <a:ext cx="9557612" cy="4577321"/>
+          </a:xfrm>
+        </p:spPr>
+        <p:txBody>
+          <a:bodyPr>
+            <a:normAutofit lnSpcReduction="10000"/>
+          </a:bodyPr>
+          <a:lstStyle/>
+          <a:p>
+            <a:pPr marL="342900" indent="-342900">
+              <a:buBlip>
+                <a:blip r:embed="rId2"/>
+              </a:buBlip>
+            </a:pPr>
+            <a:endParaRPr lang="de-DE" sz="3600" dirty="0" smtClean="0"/>
+          </a:p>
+          <a:p>
+            <a:pPr marL="342900" indent="-342900">
+              <a:buBlip>
+                <a:blip r:embed="rId2"/>
+              </a:buBlip>
+            </a:pPr>
+            <a:r>
+              <a:rPr lang="de-DE" sz="3500" dirty="0" smtClean="0"/>
+              <a:t>Umfangreiches und aufwendiges Spiel</a:t>
+            </a:r>
+            <a:endParaRPr lang="de-DE" sz="3500" dirty="0" smtClean="0"/>
+          </a:p>
+          <a:p>
+            <a:pPr marL="342900" indent="-342900">
+              <a:buBlip>
+                <a:blip r:embed="rId2"/>
+              </a:buBlip>
+            </a:pPr>
+            <a:r>
+              <a:rPr lang="de-DE" sz="3500" dirty="0" smtClean="0"/>
+              <a:t>Gute Teamarbeit</a:t>
+            </a:r>
+          </a:p>
+          <a:p>
+            <a:pPr marL="342900" indent="-342900">
+              <a:buBlip>
+                <a:blip r:embed="rId2"/>
+              </a:buBlip>
+            </a:pPr>
+            <a:r>
+              <a:rPr lang="de-DE" sz="3500" dirty="0" smtClean="0"/>
+              <a:t>Das Spiel bietet die Möglichkeit ein noch nie da gewesenes Fluggefühl zu erleben (mit </a:t>
+            </a:r>
+            <a:r>
+              <a:rPr lang="de-DE" sz="3500" dirty="0" err="1" smtClean="0"/>
+              <a:t>Oculus</a:t>
+            </a:r>
+            <a:r>
+              <a:rPr lang="de-DE" sz="3500" dirty="0" smtClean="0"/>
+              <a:t>)</a:t>
+            </a:r>
+          </a:p>
+          <a:p>
+            <a:pPr marL="342900" indent="-342900">
+              <a:buBlip>
+                <a:blip r:embed="rId2"/>
+              </a:buBlip>
+            </a:pPr>
+            <a:r>
+              <a:rPr lang="de-DE" sz="3500" dirty="0" smtClean="0"/>
+              <a:t>Gute Interaktion von allen Objekten</a:t>
+            </a:r>
+            <a:endParaRPr lang="de-DE" sz="3500" dirty="0" smtClean="0"/>
+          </a:p>
+          <a:p>
+            <a:pPr marL="342900" indent="-342900">
+              <a:buBlip>
+                <a:blip r:embed="rId2"/>
+              </a:buBlip>
+            </a:pPr>
+            <a:endParaRPr lang="de-DE" sz="4000" dirty="0"/>
+          </a:p>
+        </p:txBody>
+      </p:sp>
+    </p:spTree>
+    <p:extLst>
+      <p:ext uri="{BB962C8B-B14F-4D97-AF65-F5344CB8AC3E}">
+        <p14:creationId xmlns:p14="http://schemas.microsoft.com/office/powerpoint/2010/main" val="4150718059"/>
+      </p:ext>
+    </p:extLst>
+  </p:cSld>
+  <p:clrMapOvr>
+    <a:masterClrMapping/>
+  </p:clrMapOvr>
+  <p:timing>
+    <p:tnLst>
+      <p:par>
+        <p:cTn id="1" dur="indefinite" restart="never" nodeType="tmRoot"/>
+      </p:par>
+    </p:tnLst>
+  </p:timing>
+</p:sld>
+</file>
+
+<file path=ppt/slides/slide12.xml><?xml version="1.0" encoding="utf-8"?>
 <p:sld xmlns:a="http://schemas.openxmlformats.org/drawingml/2006/main" xmlns:r="http://schemas.openxmlformats.org/officeDocument/2006/relationships" xmlns:p="http://schemas.openxmlformats.org/presentationml/2006/main">
   <p:cSld>
     <p:spTree>
@@ -6014,7 +6177,7 @@
 </p:sld>
 </file>
 
-<file path=ppt/slides/slide12.xml><?xml version="1.0" encoding="utf-8"?>
+<file path=ppt/slides/slide13.xml><?xml version="1.0" encoding="utf-8"?>
 <p:sld xmlns:a="http://schemas.openxmlformats.org/drawingml/2006/main" xmlns:r="http://schemas.openxmlformats.org/officeDocument/2006/relationships" xmlns:p="http://schemas.openxmlformats.org/presentationml/2006/main">
   <p:cSld>
     <p:spTree>
@@ -7032,7 +7195,7 @@
 </p:sld>
 </file>
 
-<file path=ppt/slides/slide13.xml><?xml version="1.0" encoding="utf-8"?>
+<file path=ppt/slides/slide14.xml><?xml version="1.0" encoding="utf-8"?>
 <p:sld xmlns:a="http://schemas.openxmlformats.org/drawingml/2006/main" xmlns:r="http://schemas.openxmlformats.org/officeDocument/2006/relationships" xmlns:p="http://schemas.openxmlformats.org/presentationml/2006/main">
   <p:cSld>
     <p:spTree>
@@ -7128,7 +7291,7 @@
 </p:sld>
 </file>
 
-<file path=ppt/slides/slide14.xml><?xml version="1.0" encoding="utf-8"?>
+<file path=ppt/slides/slide15.xml><?xml version="1.0" encoding="utf-8"?>
 <p:sld xmlns:a="http://schemas.openxmlformats.org/drawingml/2006/main" xmlns:r="http://schemas.openxmlformats.org/officeDocument/2006/relationships" xmlns:p="http://schemas.openxmlformats.org/presentationml/2006/main">
   <p:cSld>
     <p:spTree>
@@ -7288,7 +7451,7 @@
         <p:spPr>
           <a:xfrm>
             <a:off x="1015138" y="1736393"/>
-            <a:ext cx="6909662" cy="4577321"/>
+            <a:ext cx="7797786" cy="4577321"/>
           </a:xfrm>
         </p:spPr>
         <p:txBody>
@@ -7325,6 +7488,18 @@
               <a:rPr lang="de-DE" sz="3600" dirty="0" smtClean="0"/>
               <a:t>Systemarchitektur</a:t>
             </a:r>
+          </a:p>
+          <a:p>
+            <a:pPr marL="342900" indent="-342900">
+              <a:buBlip>
+                <a:blip r:embed="rId2"/>
+              </a:buBlip>
+            </a:pPr>
+            <a:r>
+              <a:rPr lang="de-DE" sz="3600" dirty="0" smtClean="0"/>
+              <a:t>Wofür wollen wir eine gute Note</a:t>
+            </a:r>
+            <a:endParaRPr lang="de-DE" sz="3600" dirty="0" smtClean="0"/>
           </a:p>
           <a:p>
             <a:pPr marL="342900" indent="-342900">
@@ -7806,11 +7981,7 @@
             <a:pPr algn="ctr"/>
             <a:r>
               <a:rPr lang="de-DE" sz="4000" dirty="0" smtClean="0"/>
-              <a:t>Einstellungen </a:t>
-            </a:r>
-            <a:r>
-              <a:rPr lang="de-DE" sz="4000" dirty="0" smtClean="0"/>
-              <a:t>nach Klick auf „Start“</a:t>
+              <a:t>Einstellungen nach Klick auf „Start“</a:t>
             </a:r>
           </a:p>
           <a:p>
@@ -7819,7 +7990,6 @@
               <a:rPr lang="de-DE" sz="4000" dirty="0" smtClean="0"/>
               <a:t>Wahl der Zeit und des Fliegers</a:t>
             </a:r>
-            <a:endParaRPr lang="de-DE" sz="4000" dirty="0" smtClean="0"/>
           </a:p>
         </p:txBody>
       </p:sp>
@@ -8495,7 +8665,6 @@
               <a:rPr lang="de-DE" sz="4000" dirty="0" smtClean="0"/>
               <a:t>Durch Klick auf „Menü“ kehrt man zu den Spieleinstellungen zurück und kann erneut starten</a:t>
             </a:r>
-            <a:endParaRPr lang="de-DE" sz="4000" dirty="0" smtClean="0"/>
           </a:p>
           <a:p>
             <a:pPr algn="ctr"/>
@@ -8796,7 +8965,7 @@
   <a:extraClrSchemeLst/>
   <a:extLst>
     <a:ext uri="{05A4C25C-085E-4340-85A3-A5531E510DB2}">
-      <thm15:themeFamily xmlns:thm15="http://schemas.microsoft.com/office/thememl/2012/main" xmlns="" name="Slice" id="{0507925B-6AC9-4358-8E18-C330545D08F8}" vid="{2903AAAE-3EA5-424A-B142-CC51DC1F897D}"/>
+      <thm15:themeFamily xmlns="" xmlns:thm15="http://schemas.microsoft.com/office/thememl/2012/main" name="Slice" id="{0507925B-6AC9-4358-8E18-C330545D08F8}" vid="{2903AAAE-3EA5-424A-B142-CC51DC1F897D}"/>
     </a:ext>
   </a:extLst>
 </a:theme>

</xml_diff>